<commit_message>
intermediate commit for smartflow
</commit_message>
<xml_diff>
--- a/docs/CaNS_Theory.pptx
+++ b/docs/CaNS_Theory.pptx
@@ -220,7 +220,7 @@
           <a:p>
             <a:fld id="{E75B8690-9AE5-4594-AD02-E664C0110DBD}" type="datetimeFigureOut">
               <a:rPr lang="en-US" smtClean="0"/>
-              <a:t>9/30/2024</a:t>
+              <a:t>10/27/2024</a:t>
             </a:fld>
             <a:endParaRPr lang="en-US"/>
           </a:p>
@@ -889,7 +889,7 @@
           <a:p>
             <a:fld id="{D6B294E4-950D-42C1-8A28-E2C70B0CEB94}" type="datetimeFigureOut">
               <a:rPr lang="en-US" smtClean="0"/>
-              <a:t>9/30/2024</a:t>
+              <a:t>10/27/2024</a:t>
             </a:fld>
             <a:endParaRPr lang="en-US"/>
           </a:p>
@@ -1087,7 +1087,7 @@
           <a:p>
             <a:fld id="{D6B294E4-950D-42C1-8A28-E2C70B0CEB94}" type="datetimeFigureOut">
               <a:rPr lang="en-US" smtClean="0"/>
-              <a:t>9/30/2024</a:t>
+              <a:t>10/27/2024</a:t>
             </a:fld>
             <a:endParaRPr lang="en-US"/>
           </a:p>
@@ -1295,7 +1295,7 @@
           <a:p>
             <a:fld id="{D6B294E4-950D-42C1-8A28-E2C70B0CEB94}" type="datetimeFigureOut">
               <a:rPr lang="en-US" smtClean="0"/>
-              <a:t>9/30/2024</a:t>
+              <a:t>10/27/2024</a:t>
             </a:fld>
             <a:endParaRPr lang="en-US"/>
           </a:p>
@@ -1493,7 +1493,7 @@
           <a:p>
             <a:fld id="{D6B294E4-950D-42C1-8A28-E2C70B0CEB94}" type="datetimeFigureOut">
               <a:rPr lang="en-US" smtClean="0"/>
-              <a:t>9/30/2024</a:t>
+              <a:t>10/27/2024</a:t>
             </a:fld>
             <a:endParaRPr lang="en-US"/>
           </a:p>
@@ -1768,7 +1768,7 @@
           <a:p>
             <a:fld id="{D6B294E4-950D-42C1-8A28-E2C70B0CEB94}" type="datetimeFigureOut">
               <a:rPr lang="en-US" smtClean="0"/>
-              <a:t>9/30/2024</a:t>
+              <a:t>10/27/2024</a:t>
             </a:fld>
             <a:endParaRPr lang="en-US"/>
           </a:p>
@@ -2033,7 +2033,7 @@
           <a:p>
             <a:fld id="{D6B294E4-950D-42C1-8A28-E2C70B0CEB94}" type="datetimeFigureOut">
               <a:rPr lang="en-US" smtClean="0"/>
-              <a:t>9/30/2024</a:t>
+              <a:t>10/27/2024</a:t>
             </a:fld>
             <a:endParaRPr lang="en-US"/>
           </a:p>
@@ -2445,7 +2445,7 @@
           <a:p>
             <a:fld id="{D6B294E4-950D-42C1-8A28-E2C70B0CEB94}" type="datetimeFigureOut">
               <a:rPr lang="en-US" smtClean="0"/>
-              <a:t>9/30/2024</a:t>
+              <a:t>10/27/2024</a:t>
             </a:fld>
             <a:endParaRPr lang="en-US"/>
           </a:p>
@@ -2586,7 +2586,7 @@
           <a:p>
             <a:fld id="{D6B294E4-950D-42C1-8A28-E2C70B0CEB94}" type="datetimeFigureOut">
               <a:rPr lang="en-US" smtClean="0"/>
-              <a:t>9/30/2024</a:t>
+              <a:t>10/27/2024</a:t>
             </a:fld>
             <a:endParaRPr lang="en-US"/>
           </a:p>
@@ -2699,7 +2699,7 @@
           <a:p>
             <a:fld id="{D6B294E4-950D-42C1-8A28-E2C70B0CEB94}" type="datetimeFigureOut">
               <a:rPr lang="en-US" smtClean="0"/>
-              <a:t>9/30/2024</a:t>
+              <a:t>10/27/2024</a:t>
             </a:fld>
             <a:endParaRPr lang="en-US"/>
           </a:p>
@@ -3010,7 +3010,7 @@
           <a:p>
             <a:fld id="{D6B294E4-950D-42C1-8A28-E2C70B0CEB94}" type="datetimeFigureOut">
               <a:rPr lang="en-US" smtClean="0"/>
-              <a:t>9/30/2024</a:t>
+              <a:t>10/27/2024</a:t>
             </a:fld>
             <a:endParaRPr lang="en-US"/>
           </a:p>
@@ -3298,7 +3298,7 @@
           <a:p>
             <a:fld id="{D6B294E4-950D-42C1-8A28-E2C70B0CEB94}" type="datetimeFigureOut">
               <a:rPr lang="en-US" smtClean="0"/>
-              <a:t>9/30/2024</a:t>
+              <a:t>10/27/2024</a:t>
             </a:fld>
             <a:endParaRPr lang="en-US"/>
           </a:p>
@@ -3539,7 +3539,7 @@
           <a:p>
             <a:fld id="{D6B294E4-950D-42C1-8A28-E2C70B0CEB94}" type="datetimeFigureOut">
               <a:rPr lang="en-US" smtClean="0"/>
-              <a:t>9/30/2024</a:t>
+              <a:t>10/27/2024</a:t>
             </a:fld>
             <a:endParaRPr lang="en-US"/>
           </a:p>
@@ -13564,7 +13564,7 @@
         <p:spPr>
           <a:xfrm>
             <a:off x="3056466" y="5509742"/>
-            <a:ext cx="6477000" cy="0"/>
+            <a:ext cx="5399608" cy="0"/>
           </a:xfrm>
           <a:prstGeom prst="line">
             <a:avLst/>
@@ -13808,7 +13808,7 @@
           <a:prstGeom prst="line">
             <a:avLst/>
           </a:prstGeom>
-          <a:ln w="28575">
+          <a:ln w="12700">
             <a:solidFill>
               <a:schemeClr val="tx1"/>
             </a:solidFill>
@@ -13831,8 +13831,8 @@
           </a:fontRef>
         </p:style>
       </p:cxnSp>
-      <mc:AlternateContent xmlns:mc="http://schemas.openxmlformats.org/markup-compatibility/2006">
-        <mc:Choice xmlns:a14="http://schemas.microsoft.com/office/drawing/2010/main" Requires="a14">
+      <mc:AlternateContent xmlns:mc="http://schemas.openxmlformats.org/markup-compatibility/2006" xmlns:a14="http://schemas.microsoft.com/office/drawing/2010/main">
+        <mc:Choice Requires="a14">
           <p:sp>
             <p:nvSpPr>
               <p:cNvPr id="166" name="TextBox 165">
@@ -13863,6 +13863,7 @@
               </a:bodyPr>
               <a:lstStyle/>
               <a:p>
+                <a:pPr/>
                 <a14:m>
                   <m:oMathPara xmlns:m="http://schemas.openxmlformats.org/officeDocument/2006/math">
                     <m:oMathParaPr>
@@ -13905,7 +13906,7 @@
             </p:txBody>
           </p:sp>
         </mc:Choice>
-        <mc:Fallback>
+        <mc:Fallback xmlns="">
           <p:sp>
             <p:nvSpPr>
               <p:cNvPr id="166" name="TextBox 165">
@@ -14062,6 +14063,7 @@
               </a:bodyPr>
               <a:lstStyle/>
               <a:p>
+                <a:pPr/>
                 <a14:m>
                   <m:oMathPara xmlns:m="http://schemas.openxmlformats.org/officeDocument/2006/math">
                     <m:oMathParaPr>
@@ -14112,7 +14114,7 @@
                             <a:rPr lang="en-US" b="0" i="1" smtClean="0">
                               <a:latin typeface="Cambria Math" panose="02040503050406030204" pitchFamily="18" charset="0"/>
                             </a:rPr>
-                            <m:t>𝑣</m:t>
+                            <m:t>𝑤</m:t>
                           </m:r>
                         </m:e>
                         <m:sub>
@@ -14161,7 +14163,7 @@
               <a:blipFill>
                 <a:blip r:embed="rId4"/>
                 <a:stretch>
-                  <a:fillRect r="-3636"/>
+                  <a:fillRect r="-9091"/>
                 </a:stretch>
               </a:blipFill>
             </p:spPr>
@@ -14212,6 +14214,7 @@
               </a:bodyPr>
               <a:lstStyle/>
               <a:p>
+                <a:pPr/>
                 <a14:m>
                   <m:oMathPara xmlns:m="http://schemas.openxmlformats.org/officeDocument/2006/math">
                     <m:oMathParaPr>
@@ -14262,7 +14265,7 @@
                             <a:rPr lang="en-US" b="0" i="1" smtClean="0">
                               <a:latin typeface="Cambria Math" panose="02040503050406030204" pitchFamily="18" charset="0"/>
                             </a:rPr>
-                            <m:t>𝑣</m:t>
+                            <m:t>𝑤</m:t>
                           </m:r>
                         </m:e>
                         <m:sub>
@@ -14311,7 +14314,7 @@
               <a:blipFill>
                 <a:blip r:embed="rId5"/>
                 <a:stretch>
-                  <a:fillRect r="-13131"/>
+                  <a:fillRect r="-19192"/>
                 </a:stretch>
               </a:blipFill>
             </p:spPr>
@@ -14388,7 +14391,7 @@
         </p:nvCxnSpPr>
         <p:spPr>
           <a:xfrm flipV="1">
-            <a:off x="3252144" y="1545149"/>
+            <a:off x="3256378" y="1545149"/>
             <a:ext cx="0" cy="698431"/>
           </a:xfrm>
           <a:prstGeom prst="line">
@@ -14414,8 +14417,8 @@
           </a:fontRef>
         </p:style>
       </p:cxnSp>
-      <mc:AlternateContent xmlns:mc="http://schemas.openxmlformats.org/markup-compatibility/2006">
-        <mc:Choice xmlns:a14="http://schemas.microsoft.com/office/drawing/2010/main" Requires="a14">
+      <mc:AlternateContent xmlns:mc="http://schemas.openxmlformats.org/markup-compatibility/2006" xmlns:a14="http://schemas.microsoft.com/office/drawing/2010/main">
+        <mc:Choice Requires="a14">
           <p:sp>
             <p:nvSpPr>
               <p:cNvPr id="193" name="TextBox 192">
@@ -14446,6 +14449,7 @@
               </a:bodyPr>
               <a:lstStyle/>
               <a:p>
+                <a:pPr/>
                 <a14:m>
                   <m:oMathPara xmlns:m="http://schemas.openxmlformats.org/officeDocument/2006/math">
                     <m:oMathParaPr>
@@ -14469,7 +14473,7 @@
             </p:txBody>
           </p:sp>
         </mc:Choice>
-        <mc:Fallback>
+        <mc:Fallback xmlns="">
           <p:sp>
             <p:nvSpPr>
               <p:cNvPr id="193" name="TextBox 192">
@@ -14546,6 +14550,7 @@
               </a:bodyPr>
               <a:lstStyle/>
               <a:p>
+                <a:pPr/>
                 <a14:m>
                   <m:oMathPara xmlns:m="http://schemas.openxmlformats.org/officeDocument/2006/math">
                     <m:oMathParaPr>
@@ -14555,8 +14560,9 @@
                       <m:r>
                         <a:rPr lang="en-US" b="0" i="1" smtClean="0">
                           <a:latin typeface="Cambria Math" panose="02040503050406030204" pitchFamily="18" charset="0"/>
+                          <a:cs typeface="Times New Roman" panose="02020603050405020304" pitchFamily="18" charset="0"/>
                         </a:rPr>
-                        <m:t>𝑧</m:t>
+                        <m:t>𝑦</m:t>
                       </m:r>
                     </m:oMath>
                   </m:oMathPara>
@@ -14595,7 +14601,7 @@
               <a:blipFill>
                 <a:blip r:embed="rId7"/>
                 <a:stretch>
-                  <a:fillRect/>
+                  <a:fillRect b="-8333"/>
                 </a:stretch>
               </a:blipFill>
             </p:spPr>
@@ -14630,8 +14636,8 @@
             </p:nvSpPr>
             <p:spPr>
               <a:xfrm>
-                <a:off x="4318443" y="5633528"/>
-                <a:ext cx="1465157" cy="411010"/>
+                <a:off x="5216523" y="5791059"/>
+                <a:ext cx="1465157" cy="369332"/>
               </a:xfrm>
               <a:prstGeom prst="rect">
                 <a:avLst/>
@@ -14646,19 +14652,39 @@
               </a:bodyPr>
               <a:lstStyle/>
               <a:p>
+                <a:pPr/>
                 <a14:m>
                   <m:oMathPara xmlns:m="http://schemas.openxmlformats.org/officeDocument/2006/math">
                     <m:oMathParaPr>
                       <m:jc m:val="centerGroup"/>
                     </m:oMathParaPr>
                     <m:oMath xmlns:m="http://schemas.openxmlformats.org/officeDocument/2006/math">
-                      <m:r>
-                        <a:rPr lang="en-US" i="1">
-                          <a:latin typeface="Cambria Math" panose="02040503050406030204" pitchFamily="18" charset="0"/>
-                          <a:ea typeface="Cambria Math" panose="02040503050406030204" pitchFamily="18" charset="0"/>
-                        </a:rPr>
-                        <m:t>𝜏</m:t>
-                      </m:r>
+                      <m:sSub>
+                        <m:sSubPr>
+                          <m:ctrlPr>
+                            <a:rPr lang="en-US" b="0" i="1" smtClean="0">
+                              <a:latin typeface="Cambria Math" panose="02040503050406030204" pitchFamily="18" charset="0"/>
+                            </a:rPr>
+                          </m:ctrlPr>
+                        </m:sSubPr>
+                        <m:e>
+                          <m:r>
+                            <a:rPr lang="en-US" b="1" i="1" smtClean="0">
+                              <a:latin typeface="Cambria Math" panose="02040503050406030204" pitchFamily="18" charset="0"/>
+                              <a:ea typeface="Cambria Math" panose="02040503050406030204" pitchFamily="18" charset="0"/>
+                            </a:rPr>
+                            <m:t>𝝉</m:t>
+                          </m:r>
+                        </m:e>
+                        <m:sub>
+                          <m:r>
+                            <a:rPr lang="en-US" b="0" i="1" smtClean="0">
+                              <a:latin typeface="Cambria Math" panose="02040503050406030204" pitchFamily="18" charset="0"/>
+                            </a:rPr>
+                            <m:t>𝑤</m:t>
+                          </m:r>
+                        </m:sub>
+                      </m:sSub>
                       <m:r>
                         <a:rPr lang="en-US" b="0" i="1" smtClean="0">
                           <a:latin typeface="Cambria Math" panose="02040503050406030204" pitchFamily="18" charset="0"/>
@@ -14725,11 +14751,11 @@
                             </m:e>
                             <m:sub>
                               <m:r>
-                                <a:rPr lang="en-US" i="1">
+                                <a:rPr lang="en-US" b="0" i="1" smtClean="0">
                                   <a:latin typeface="Cambria Math" panose="02040503050406030204" pitchFamily="18" charset="0"/>
                                   <a:ea typeface="Cambria Math" panose="02040503050406030204" pitchFamily="18" charset="0"/>
                                 </a:rPr>
-                                <m:t>𝑦</m:t>
+                                <m:t>𝑧</m:t>
                               </m:r>
                             </m:sub>
                           </m:sSub>
@@ -14763,8 +14789,8 @@
             </p:nvSpPr>
             <p:spPr>
               <a:xfrm>
-                <a:off x="4318443" y="5633528"/>
-                <a:ext cx="1465157" cy="411010"/>
+                <a:off x="5216523" y="5791059"/>
+                <a:ext cx="1465157" cy="369332"/>
               </a:xfrm>
               <a:prstGeom prst="rect">
                 <a:avLst/>
@@ -14772,7 +14798,7 @@
               <a:blipFill>
                 <a:blip r:embed="rId8"/>
                 <a:stretch>
-                  <a:fillRect b="-2941"/>
+                  <a:fillRect/>
                 </a:stretch>
               </a:blipFill>
             </p:spPr>
@@ -14993,206 +15019,6 @@
       </p:sp>
       <p:sp>
         <p:nvSpPr>
-          <p:cNvPr id="209" name="Rectangle 208">
-            <a:extLst>
-              <a:ext uri="{FF2B5EF4-FFF2-40B4-BE49-F238E27FC236}">
-                <a16:creationId xmlns:a16="http://schemas.microsoft.com/office/drawing/2014/main" id="{9CE158DC-87D1-08FB-E258-EC3FAECDEF53}"/>
-              </a:ext>
-            </a:extLst>
-          </p:cNvPr>
-          <p:cNvSpPr/>
-          <p:nvPr/>
-        </p:nvSpPr>
-        <p:spPr>
-          <a:xfrm>
-            <a:off x="8456074" y="2243672"/>
-            <a:ext cx="868101" cy="816728"/>
-          </a:xfrm>
-          <a:prstGeom prst="rect">
-            <a:avLst/>
-          </a:prstGeom>
-          <a:noFill/>
-        </p:spPr>
-        <p:style>
-          <a:lnRef idx="2">
-            <a:schemeClr val="accent1">
-              <a:shade val="50000"/>
-            </a:schemeClr>
-          </a:lnRef>
-          <a:fillRef idx="1">
-            <a:schemeClr val="accent1"/>
-          </a:fillRef>
-          <a:effectRef idx="0">
-            <a:schemeClr val="accent1"/>
-          </a:effectRef>
-          <a:fontRef idx="minor">
-            <a:schemeClr val="lt1"/>
-          </a:fontRef>
-        </p:style>
-        <p:txBody>
-          <a:bodyPr rtlCol="0" anchor="ctr"/>
-          <a:lstStyle/>
-          <a:p>
-            <a:pPr algn="ctr"/>
-            <a:endParaRPr lang="en-US">
-              <a:latin typeface="Times New Roman" panose="02020603050405020304" pitchFamily="18" charset="0"/>
-              <a:cs typeface="Times New Roman" panose="02020603050405020304" pitchFamily="18" charset="0"/>
-            </a:endParaRPr>
-          </a:p>
-        </p:txBody>
-      </p:sp>
-      <p:sp>
-        <p:nvSpPr>
-          <p:cNvPr id="210" name="Rectangle 209">
-            <a:extLst>
-              <a:ext uri="{FF2B5EF4-FFF2-40B4-BE49-F238E27FC236}">
-                <a16:creationId xmlns:a16="http://schemas.microsoft.com/office/drawing/2014/main" id="{49DDFECA-A619-0C34-A030-FF42E51193C0}"/>
-              </a:ext>
-            </a:extLst>
-          </p:cNvPr>
-          <p:cNvSpPr/>
-          <p:nvPr/>
-        </p:nvSpPr>
-        <p:spPr>
-          <a:xfrm>
-            <a:off x="8456074" y="3060400"/>
-            <a:ext cx="868101" cy="816728"/>
-          </a:xfrm>
-          <a:prstGeom prst="rect">
-            <a:avLst/>
-          </a:prstGeom>
-          <a:noFill/>
-        </p:spPr>
-        <p:style>
-          <a:lnRef idx="2">
-            <a:schemeClr val="accent1">
-              <a:shade val="50000"/>
-            </a:schemeClr>
-          </a:lnRef>
-          <a:fillRef idx="1">
-            <a:schemeClr val="accent1"/>
-          </a:fillRef>
-          <a:effectRef idx="0">
-            <a:schemeClr val="accent1"/>
-          </a:effectRef>
-          <a:fontRef idx="minor">
-            <a:schemeClr val="lt1"/>
-          </a:fontRef>
-        </p:style>
-        <p:txBody>
-          <a:bodyPr rtlCol="0" anchor="ctr"/>
-          <a:lstStyle/>
-          <a:p>
-            <a:pPr algn="ctr"/>
-            <a:endParaRPr lang="en-US">
-              <a:latin typeface="Times New Roman" panose="02020603050405020304" pitchFamily="18" charset="0"/>
-              <a:cs typeface="Times New Roman" panose="02020603050405020304" pitchFamily="18" charset="0"/>
-            </a:endParaRPr>
-          </a:p>
-        </p:txBody>
-      </p:sp>
-      <p:sp>
-        <p:nvSpPr>
-          <p:cNvPr id="211" name="Rectangle 210">
-            <a:extLst>
-              <a:ext uri="{FF2B5EF4-FFF2-40B4-BE49-F238E27FC236}">
-                <a16:creationId xmlns:a16="http://schemas.microsoft.com/office/drawing/2014/main" id="{D04CD9FB-A504-5366-F7B6-FB5DCD1BCE8C}"/>
-              </a:ext>
-            </a:extLst>
-          </p:cNvPr>
-          <p:cNvSpPr/>
-          <p:nvPr/>
-        </p:nvSpPr>
-        <p:spPr>
-          <a:xfrm>
-            <a:off x="8456074" y="3877128"/>
-            <a:ext cx="868101" cy="816728"/>
-          </a:xfrm>
-          <a:prstGeom prst="rect">
-            <a:avLst/>
-          </a:prstGeom>
-          <a:noFill/>
-        </p:spPr>
-        <p:style>
-          <a:lnRef idx="2">
-            <a:schemeClr val="accent1">
-              <a:shade val="50000"/>
-            </a:schemeClr>
-          </a:lnRef>
-          <a:fillRef idx="1">
-            <a:schemeClr val="accent1"/>
-          </a:fillRef>
-          <a:effectRef idx="0">
-            <a:schemeClr val="accent1"/>
-          </a:effectRef>
-          <a:fontRef idx="minor">
-            <a:schemeClr val="lt1"/>
-          </a:fontRef>
-        </p:style>
-        <p:txBody>
-          <a:bodyPr rtlCol="0" anchor="ctr"/>
-          <a:lstStyle/>
-          <a:p>
-            <a:pPr algn="ctr"/>
-            <a:endParaRPr lang="en-US">
-              <a:latin typeface="Times New Roman" panose="02020603050405020304" pitchFamily="18" charset="0"/>
-              <a:cs typeface="Times New Roman" panose="02020603050405020304" pitchFamily="18" charset="0"/>
-            </a:endParaRPr>
-          </a:p>
-        </p:txBody>
-      </p:sp>
-      <p:sp>
-        <p:nvSpPr>
-          <p:cNvPr id="212" name="Rectangle 211">
-            <a:extLst>
-              <a:ext uri="{FF2B5EF4-FFF2-40B4-BE49-F238E27FC236}">
-                <a16:creationId xmlns:a16="http://schemas.microsoft.com/office/drawing/2014/main" id="{22FFB1E0-ECF8-1AFA-3273-C96C11934E15}"/>
-              </a:ext>
-            </a:extLst>
-          </p:cNvPr>
-          <p:cNvSpPr/>
-          <p:nvPr/>
-        </p:nvSpPr>
-        <p:spPr>
-          <a:xfrm>
-            <a:off x="8456074" y="4693856"/>
-            <a:ext cx="868101" cy="816728"/>
-          </a:xfrm>
-          <a:prstGeom prst="rect">
-            <a:avLst/>
-          </a:prstGeom>
-          <a:noFill/>
-        </p:spPr>
-        <p:style>
-          <a:lnRef idx="2">
-            <a:schemeClr val="accent1">
-              <a:shade val="50000"/>
-            </a:schemeClr>
-          </a:lnRef>
-          <a:fillRef idx="1">
-            <a:schemeClr val="accent1"/>
-          </a:fillRef>
-          <a:effectRef idx="0">
-            <a:schemeClr val="accent1"/>
-          </a:effectRef>
-          <a:fontRef idx="minor">
-            <a:schemeClr val="lt1"/>
-          </a:fontRef>
-        </p:style>
-        <p:txBody>
-          <a:bodyPr rtlCol="0" anchor="ctr"/>
-          <a:lstStyle/>
-          <a:p>
-            <a:pPr algn="ctr"/>
-            <a:endParaRPr lang="en-US">
-              <a:latin typeface="Times New Roman" panose="02020603050405020304" pitchFamily="18" charset="0"/>
-              <a:cs typeface="Times New Roman" panose="02020603050405020304" pitchFamily="18" charset="0"/>
-            </a:endParaRPr>
-          </a:p>
-        </p:txBody>
-      </p:sp>
-      <p:sp>
-        <p:nvSpPr>
           <p:cNvPr id="213" name="Freeform: Shape 212">
             <a:extLst>
               <a:ext uri="{FF2B5EF4-FFF2-40B4-BE49-F238E27FC236}">
@@ -15206,7 +15032,7 @@
         <p:spPr>
           <a:xfrm>
             <a:off x="4990818" y="2228850"/>
-            <a:ext cx="4333351" cy="3276600"/>
+            <a:ext cx="2094330" cy="3276600"/>
           </a:xfrm>
           <a:custGeom>
             <a:avLst/>
@@ -15329,18 +15155,19 @@
           </p:cNvPr>
           <p:cNvCxnSpPr>
             <a:cxnSpLocks/>
+            <a:endCxn id="224" idx="2"/>
           </p:cNvCxnSpPr>
           <p:nvPr/>
         </p:nvCxnSpPr>
         <p:spPr>
           <a:xfrm>
-            <a:off x="2881547" y="3178017"/>
-            <a:ext cx="6974723" cy="0"/>
+            <a:off x="3993192" y="3176114"/>
+            <a:ext cx="883066" cy="0"/>
           </a:xfrm>
           <a:prstGeom prst="line">
             <a:avLst/>
           </a:prstGeom>
-          <a:ln w="28575">
+          <a:ln w="12700">
             <a:solidFill>
               <a:schemeClr val="tx1"/>
             </a:solidFill>
@@ -15380,8 +15207,8 @@
             </p:nvSpPr>
             <p:spPr>
               <a:xfrm>
-                <a:off x="5115767" y="2973154"/>
-                <a:ext cx="668745" cy="369332"/>
+                <a:off x="7727546" y="2860598"/>
+                <a:ext cx="1217314" cy="369332"/>
               </a:xfrm>
               <a:prstGeom prst="rect">
                 <a:avLst/>
@@ -15396,6 +15223,7 @@
               </a:bodyPr>
               <a:lstStyle/>
               <a:p>
+                <a:pPr/>
                 <a14:m>
                   <m:oMathPara xmlns:m="http://schemas.openxmlformats.org/officeDocument/2006/math">
                     <m:oMathParaPr>
@@ -15415,7 +15243,38 @@
                             <a:rPr lang="en-US" b="0" i="1" smtClean="0">
                               <a:latin typeface="Cambria Math" panose="02040503050406030204" pitchFamily="18" charset="0"/>
                             </a:rPr>
-                            <m:t>𝑈</m:t>
+                            <m:t>𝑢</m:t>
+                          </m:r>
+                        </m:e>
+                        <m:sub>
+                          <m:r>
+                            <a:rPr lang="en-US" b="0" i="1" smtClean="0">
+                              <a:latin typeface="Cambria Math" panose="02040503050406030204" pitchFamily="18" charset="0"/>
+                            </a:rPr>
+                            <m:t>𝑤𝑚</m:t>
+                          </m:r>
+                        </m:sub>
+                      </m:sSub>
+                      <m:r>
+                        <a:rPr lang="en-US" b="0" i="1" smtClean="0">
+                          <a:latin typeface="Cambria Math" panose="02040503050406030204" pitchFamily="18" charset="0"/>
+                        </a:rPr>
+                        <m:t>,</m:t>
+                      </m:r>
+                      <m:sSub>
+                        <m:sSubPr>
+                          <m:ctrlPr>
+                            <a:rPr lang="pt-BR" i="1">
+                              <a:latin typeface="Cambria Math" panose="02040503050406030204" pitchFamily="18" charset="0"/>
+                            </a:rPr>
+                          </m:ctrlPr>
+                        </m:sSubPr>
+                        <m:e>
+                          <m:r>
+                            <a:rPr lang="en-US" b="0" i="1" smtClean="0">
+                              <a:latin typeface="Cambria Math" panose="02040503050406030204" pitchFamily="18" charset="0"/>
+                            </a:rPr>
+                            <m:t>𝑤</m:t>
                           </m:r>
                         </m:e>
                         <m:sub>
@@ -15455,8 +15314,8 @@
             </p:nvSpPr>
             <p:spPr>
               <a:xfrm>
-                <a:off x="5115767" y="2973154"/>
-                <a:ext cx="668745" cy="369332"/>
+                <a:off x="7727546" y="2860598"/>
+                <a:ext cx="1217314" cy="369332"/>
               </a:xfrm>
               <a:prstGeom prst="rect">
                 <a:avLst/>
@@ -15646,7 +15505,7 @@
             </p:nvSpPr>
             <p:spPr>
               <a:xfrm>
-                <a:off x="8152772" y="3785303"/>
+                <a:off x="6064987" y="4052908"/>
                 <a:ext cx="606604" cy="369332"/>
               </a:xfrm>
               <a:prstGeom prst="rect">
@@ -15662,6 +15521,7 @@
               </a:bodyPr>
               <a:lstStyle/>
               <a:p>
+                <a:pPr/>
                 <a14:m>
                   <m:oMathPara xmlns:m="http://schemas.openxmlformats.org/officeDocument/2006/math">
                     <m:oMathParaPr>
@@ -15687,7 +15547,7 @@
                             <a:rPr lang="en-US" b="0" i="1" smtClean="0">
                               <a:latin typeface="Cambria Math" panose="02040503050406030204" pitchFamily="18" charset="0"/>
                             </a:rPr>
-                            <m:t>𝑧</m:t>
+                            <m:t>𝑦</m:t>
                           </m:r>
                         </m:e>
                       </m:d>
@@ -15719,7 +15579,7 @@
             </p:nvSpPr>
             <p:spPr>
               <a:xfrm>
-                <a:off x="8152772" y="3785303"/>
+                <a:off x="6064987" y="4052908"/>
                 <a:ext cx="606604" cy="369332"/>
               </a:xfrm>
               <a:prstGeom prst="rect">
@@ -15728,7 +15588,7 @@
               <a:blipFill>
                 <a:blip r:embed="rId10"/>
                 <a:stretch>
-                  <a:fillRect/>
+                  <a:fillRect b="-8333"/>
                 </a:stretch>
               </a:blipFill>
             </p:spPr>
@@ -15793,6 +15653,241 @@
               <a:latin typeface="Times New Roman" panose="02020603050405020304" pitchFamily="18" charset="0"/>
               <a:cs typeface="Times New Roman" panose="02020603050405020304" pitchFamily="18" charset="0"/>
             </a:endParaRPr>
+          </a:p>
+        </p:txBody>
+      </p:sp>
+      <p:sp>
+        <p:nvSpPr>
+          <p:cNvPr id="2" name="Rectangle: Rounded Corners 1">
+            <a:extLst>
+              <a:ext uri="{FF2B5EF4-FFF2-40B4-BE49-F238E27FC236}">
+                <a16:creationId xmlns:a16="http://schemas.microsoft.com/office/drawing/2014/main" id="{03BB1125-2745-4900-79AA-259CF9EA68DD}"/>
+              </a:ext>
+            </a:extLst>
+          </p:cNvPr>
+          <p:cNvSpPr/>
+          <p:nvPr/>
+        </p:nvSpPr>
+        <p:spPr>
+          <a:xfrm>
+            <a:off x="8633184" y="4198017"/>
+            <a:ext cx="1377894" cy="523475"/>
+          </a:xfrm>
+          <a:prstGeom prst="roundRect">
+            <a:avLst/>
+          </a:prstGeom>
+          <a:noFill/>
+          <a:ln w="28575"/>
+        </p:spPr>
+        <p:style>
+          <a:lnRef idx="2">
+            <a:schemeClr val="accent1">
+              <a:shade val="15000"/>
+            </a:schemeClr>
+          </a:lnRef>
+          <a:fillRef idx="1">
+            <a:schemeClr val="accent1"/>
+          </a:fillRef>
+          <a:effectRef idx="0">
+            <a:schemeClr val="accent1"/>
+          </a:effectRef>
+          <a:fontRef idx="minor">
+            <a:schemeClr val="lt1"/>
+          </a:fontRef>
+        </p:style>
+        <p:txBody>
+          <a:bodyPr rtlCol="0" anchor="ctr"/>
+          <a:lstStyle/>
+          <a:p>
+            <a:pPr algn="ctr"/>
+            <a:r>
+              <a:rPr lang="en-US" dirty="0">
+                <a:solidFill>
+                  <a:schemeClr val="tx1"/>
+                </a:solidFill>
+                <a:latin typeface="Times New Roman" panose="02020603050405020304" pitchFamily="18" charset="0"/>
+                <a:cs typeface="Times New Roman" panose="02020603050405020304" pitchFamily="18" charset="0"/>
+              </a:rPr>
+              <a:t>Wall model</a:t>
+            </a:r>
+          </a:p>
+        </p:txBody>
+      </p:sp>
+      <p:sp>
+        <p:nvSpPr>
+          <p:cNvPr id="20" name="Freeform: Shape 19">
+            <a:extLst>
+              <a:ext uri="{FF2B5EF4-FFF2-40B4-BE49-F238E27FC236}">
+                <a16:creationId xmlns:a16="http://schemas.microsoft.com/office/drawing/2014/main" id="{AACEB029-9AB8-1D9B-E23C-28F31E45844B}"/>
+              </a:ext>
+            </a:extLst>
+          </p:cNvPr>
+          <p:cNvSpPr/>
+          <p:nvPr/>
+        </p:nvSpPr>
+        <p:spPr>
+          <a:xfrm>
+            <a:off x="5216523" y="3166203"/>
+            <a:ext cx="4106070" cy="991397"/>
+          </a:xfrm>
+          <a:custGeom>
+            <a:avLst/>
+            <a:gdLst>
+              <a:gd name="connsiteX0" fmla="*/ 0 w 2921000"/>
+              <a:gd name="connsiteY0" fmla="*/ 2913 h 688713"/>
+              <a:gd name="connsiteX1" fmla="*/ 1625600 w 2921000"/>
+              <a:gd name="connsiteY1" fmla="*/ 104513 h 688713"/>
+              <a:gd name="connsiteX2" fmla="*/ 2921000 w 2921000"/>
+              <a:gd name="connsiteY2" fmla="*/ 688713 h 688713"/>
+            </a:gdLst>
+            <a:ahLst/>
+            <a:cxnLst>
+              <a:cxn ang="0">
+                <a:pos x="connsiteX0" y="connsiteY0"/>
+              </a:cxn>
+              <a:cxn ang="0">
+                <a:pos x="connsiteX1" y="connsiteY1"/>
+              </a:cxn>
+              <a:cxn ang="0">
+                <a:pos x="connsiteX2" y="connsiteY2"/>
+              </a:cxn>
+            </a:cxnLst>
+            <a:rect l="l" t="t" r="r" b="b"/>
+            <a:pathLst>
+              <a:path w="2921000" h="688713">
+                <a:moveTo>
+                  <a:pt x="0" y="2913"/>
+                </a:moveTo>
+                <a:cubicBezTo>
+                  <a:pt x="569383" y="-3437"/>
+                  <a:pt x="1138767" y="-9787"/>
+                  <a:pt x="1625600" y="104513"/>
+                </a:cubicBezTo>
+                <a:cubicBezTo>
+                  <a:pt x="2112433" y="218813"/>
+                  <a:pt x="2516716" y="453763"/>
+                  <a:pt x="2921000" y="688713"/>
+                </a:cubicBezTo>
+              </a:path>
+            </a:pathLst>
+          </a:custGeom>
+          <a:noFill/>
+          <a:ln>
+            <a:headEnd type="none" w="med" len="med"/>
+            <a:tailEnd type="arrow" w="med" len="med"/>
+          </a:ln>
+        </p:spPr>
+        <p:style>
+          <a:lnRef idx="2">
+            <a:schemeClr val="accent1">
+              <a:shade val="15000"/>
+            </a:schemeClr>
+          </a:lnRef>
+          <a:fillRef idx="1">
+            <a:schemeClr val="accent1"/>
+          </a:fillRef>
+          <a:effectRef idx="0">
+            <a:schemeClr val="accent1"/>
+          </a:effectRef>
+          <a:fontRef idx="minor">
+            <a:schemeClr val="lt1"/>
+          </a:fontRef>
+        </p:style>
+        <p:txBody>
+          <a:bodyPr rtlCol="0" anchor="ctr"/>
+          <a:lstStyle/>
+          <a:p>
+            <a:pPr algn="ctr"/>
+            <a:endParaRPr lang="en-US" dirty="0"/>
+          </a:p>
+        </p:txBody>
+      </p:sp>
+      <p:sp>
+        <p:nvSpPr>
+          <p:cNvPr id="38" name="Freeform: Shape 37">
+            <a:extLst>
+              <a:ext uri="{FF2B5EF4-FFF2-40B4-BE49-F238E27FC236}">
+                <a16:creationId xmlns:a16="http://schemas.microsoft.com/office/drawing/2014/main" id="{EC90FBAD-37BE-BF86-3E8D-4E948335921C}"/>
+              </a:ext>
+            </a:extLst>
+          </p:cNvPr>
+          <p:cNvSpPr/>
+          <p:nvPr/>
+        </p:nvSpPr>
+        <p:spPr>
+          <a:xfrm>
+            <a:off x="5103672" y="4778843"/>
+            <a:ext cx="4201195" cy="1012214"/>
+          </a:xfrm>
+          <a:custGeom>
+            <a:avLst/>
+            <a:gdLst>
+              <a:gd name="connsiteX0" fmla="*/ 4191000 w 4191000"/>
+              <a:gd name="connsiteY0" fmla="*/ 0 h 1453009"/>
+              <a:gd name="connsiteX1" fmla="*/ 3200400 w 4191000"/>
+              <a:gd name="connsiteY1" fmla="*/ 1371600 h 1453009"/>
+              <a:gd name="connsiteX2" fmla="*/ 0 w 4191000"/>
+              <a:gd name="connsiteY2" fmla="*/ 1176867 h 1453009"/>
+            </a:gdLst>
+            <a:ahLst/>
+            <a:cxnLst>
+              <a:cxn ang="0">
+                <a:pos x="connsiteX0" y="connsiteY0"/>
+              </a:cxn>
+              <a:cxn ang="0">
+                <a:pos x="connsiteX1" y="connsiteY1"/>
+              </a:cxn>
+              <a:cxn ang="0">
+                <a:pos x="connsiteX2" y="connsiteY2"/>
+              </a:cxn>
+            </a:cxnLst>
+            <a:rect l="l" t="t" r="r" b="b"/>
+            <a:pathLst>
+              <a:path w="4191000" h="1453009">
+                <a:moveTo>
+                  <a:pt x="4191000" y="0"/>
+                </a:moveTo>
+                <a:cubicBezTo>
+                  <a:pt x="4044950" y="587728"/>
+                  <a:pt x="3898900" y="1175456"/>
+                  <a:pt x="3200400" y="1371600"/>
+                </a:cubicBezTo>
+                <a:cubicBezTo>
+                  <a:pt x="2501900" y="1567744"/>
+                  <a:pt x="1250950" y="1372305"/>
+                  <a:pt x="0" y="1176867"/>
+                </a:cubicBezTo>
+              </a:path>
+            </a:pathLst>
+          </a:custGeom>
+          <a:noFill/>
+          <a:ln>
+            <a:headEnd type="none" w="med" len="med"/>
+            <a:tailEnd type="arrow" w="med" len="med"/>
+          </a:ln>
+        </p:spPr>
+        <p:style>
+          <a:lnRef idx="2">
+            <a:schemeClr val="accent1">
+              <a:shade val="15000"/>
+            </a:schemeClr>
+          </a:lnRef>
+          <a:fillRef idx="1">
+            <a:schemeClr val="accent1"/>
+          </a:fillRef>
+          <a:effectRef idx="0">
+            <a:schemeClr val="accent1"/>
+          </a:effectRef>
+          <a:fontRef idx="minor">
+            <a:schemeClr val="lt1"/>
+          </a:fontRef>
+        </p:style>
+        <p:txBody>
+          <a:bodyPr rtlCol="0" anchor="ctr"/>
+          <a:lstStyle/>
+          <a:p>
+            <a:pPr algn="ctr"/>
+            <a:endParaRPr lang="en-US"/>
           </a:p>
         </p:txBody>
       </p:sp>

</xml_diff>